<commit_message>
updating glossary and presentation
</commit_message>
<xml_diff>
--- a/Documents/Model/מערכת לניהול הפרויקט.pptx
+++ b/Documents/Model/מערכת לניהול הפרויקט.pptx
@@ -16,7 +16,6 @@
     <p:sldId id="260" r:id="rId10"/>
     <p:sldId id="266" r:id="rId11"/>
     <p:sldId id="261" r:id="rId12"/>
-    <p:sldId id="267" r:id="rId13"/>
   </p:sldIdLst>
   <p:sldSz cx="12192000" cy="6858000"/>
   <p:notesSz cx="6858000" cy="9144000"/>
@@ -115,6 +114,11 @@
       </a:defRPr>
     </a:lvl9pPr>
   </p:defaultTextStyle>
+  <p:extLst>
+    <p:ext uri="{EFAFB233-063F-42B5-8137-9DF3F51BA10A}">
+      <p15:sldGuideLst xmlns:p15="http://schemas.microsoft.com/office/powerpoint/2012/main"/>
+    </p:ext>
+  </p:extLst>
 </p:presentation>
 </file>
 
@@ -852,7 +856,7 @@
           <a:p>
             <a:fld id="{F138CC8D-C819-4717-8FDA-DAFA9F87967E}" type="datetimeFigureOut">
               <a:rPr lang="en-US" smtClean="0"/>
-              <a:t>3/9/2019</a:t>
+              <a:t>3/10/2019</a:t>
             </a:fld>
             <a:endParaRPr lang="en-US"/>
           </a:p>
@@ -1103,7 +1107,7 @@
           <a:p>
             <a:fld id="{F138CC8D-C819-4717-8FDA-DAFA9F87967E}" type="datetimeFigureOut">
               <a:rPr lang="en-US" smtClean="0"/>
-              <a:t>3/9/2019</a:t>
+              <a:t>3/10/2019</a:t>
             </a:fld>
             <a:endParaRPr lang="en-US"/>
           </a:p>
@@ -1417,7 +1421,7 @@
           <a:p>
             <a:fld id="{F138CC8D-C819-4717-8FDA-DAFA9F87967E}" type="datetimeFigureOut">
               <a:rPr lang="en-US" smtClean="0"/>
-              <a:t>3/9/2019</a:t>
+              <a:t>3/10/2019</a:t>
             </a:fld>
             <a:endParaRPr lang="en-US"/>
           </a:p>
@@ -1758,7 +1762,7 @@
           <a:p>
             <a:fld id="{F138CC8D-C819-4717-8FDA-DAFA9F87967E}" type="datetimeFigureOut">
               <a:rPr lang="en-US" smtClean="0"/>
-              <a:t>3/9/2019</a:t>
+              <a:t>3/10/2019</a:t>
             </a:fld>
             <a:endParaRPr lang="en-US"/>
           </a:p>
@@ -2072,7 +2076,7 @@
           <a:p>
             <a:fld id="{F138CC8D-C819-4717-8FDA-DAFA9F87967E}" type="datetimeFigureOut">
               <a:rPr lang="en-US" smtClean="0"/>
-              <a:t>3/9/2019</a:t>
+              <a:t>3/10/2019</a:t>
             </a:fld>
             <a:endParaRPr lang="en-US"/>
           </a:p>
@@ -2465,7 +2469,7 @@
           <a:p>
             <a:fld id="{F138CC8D-C819-4717-8FDA-DAFA9F87967E}" type="datetimeFigureOut">
               <a:rPr lang="en-US" smtClean="0"/>
-              <a:t>3/9/2019</a:t>
+              <a:t>3/10/2019</a:t>
             </a:fld>
             <a:endParaRPr lang="en-US"/>
           </a:p>
@@ -2635,7 +2639,7 @@
           <a:p>
             <a:fld id="{F138CC8D-C819-4717-8FDA-DAFA9F87967E}" type="datetimeFigureOut">
               <a:rPr lang="en-US" smtClean="0"/>
-              <a:t>3/9/2019</a:t>
+              <a:t>3/10/2019</a:t>
             </a:fld>
             <a:endParaRPr lang="en-US"/>
           </a:p>
@@ -2815,7 +2819,7 @@
           <a:p>
             <a:fld id="{F138CC8D-C819-4717-8FDA-DAFA9F87967E}" type="datetimeFigureOut">
               <a:rPr lang="en-US" smtClean="0"/>
-              <a:t>3/9/2019</a:t>
+              <a:t>3/10/2019</a:t>
             </a:fld>
             <a:endParaRPr lang="en-US"/>
           </a:p>
@@ -2991,7 +2995,7 @@
           <a:p>
             <a:fld id="{F138CC8D-C819-4717-8FDA-DAFA9F87967E}" type="datetimeFigureOut">
               <a:rPr lang="en-US" smtClean="0"/>
-              <a:t>3/9/2019</a:t>
+              <a:t>3/10/2019</a:t>
             </a:fld>
             <a:endParaRPr lang="en-US"/>
           </a:p>
@@ -3238,7 +3242,7 @@
           <a:p>
             <a:fld id="{F138CC8D-C819-4717-8FDA-DAFA9F87967E}" type="datetimeFigureOut">
               <a:rPr lang="en-US" smtClean="0"/>
-              <a:t>3/9/2019</a:t>
+              <a:t>3/10/2019</a:t>
             </a:fld>
             <a:endParaRPr lang="en-US"/>
           </a:p>
@@ -3470,7 +3474,7 @@
           <a:p>
             <a:fld id="{F138CC8D-C819-4717-8FDA-DAFA9F87967E}" type="datetimeFigureOut">
               <a:rPr lang="en-US" smtClean="0"/>
-              <a:t>3/9/2019</a:t>
+              <a:t>3/10/2019</a:t>
             </a:fld>
             <a:endParaRPr lang="en-US"/>
           </a:p>
@@ -3844,7 +3848,7 @@
           <a:p>
             <a:fld id="{F138CC8D-C819-4717-8FDA-DAFA9F87967E}" type="datetimeFigureOut">
               <a:rPr lang="en-US" smtClean="0"/>
-              <a:t>3/9/2019</a:t>
+              <a:t>3/10/2019</a:t>
             </a:fld>
             <a:endParaRPr lang="en-US"/>
           </a:p>
@@ -3967,7 +3971,7 @@
           <a:p>
             <a:fld id="{F138CC8D-C819-4717-8FDA-DAFA9F87967E}" type="datetimeFigureOut">
               <a:rPr lang="en-US" smtClean="0"/>
-              <a:t>3/9/2019</a:t>
+              <a:t>3/10/2019</a:t>
             </a:fld>
             <a:endParaRPr lang="en-US"/>
           </a:p>
@@ -4062,7 +4066,7 @@
           <a:p>
             <a:fld id="{F138CC8D-C819-4717-8FDA-DAFA9F87967E}" type="datetimeFigureOut">
               <a:rPr lang="en-US" smtClean="0"/>
-              <a:t>3/9/2019</a:t>
+              <a:t>3/10/2019</a:t>
             </a:fld>
             <a:endParaRPr lang="en-US"/>
           </a:p>
@@ -4317,7 +4321,7 @@
           <a:p>
             <a:fld id="{F138CC8D-C819-4717-8FDA-DAFA9F87967E}" type="datetimeFigureOut">
               <a:rPr lang="en-US" smtClean="0"/>
-              <a:t>3/9/2019</a:t>
+              <a:t>3/10/2019</a:t>
             </a:fld>
             <a:endParaRPr lang="en-US"/>
           </a:p>
@@ -4580,7 +4584,7 @@
           <a:p>
             <a:fld id="{F138CC8D-C819-4717-8FDA-DAFA9F87967E}" type="datetimeFigureOut">
               <a:rPr lang="en-US" smtClean="0"/>
-              <a:t>3/9/2019</a:t>
+              <a:t>3/10/2019</a:t>
             </a:fld>
             <a:endParaRPr lang="en-US"/>
           </a:p>
@@ -5323,7 +5327,7 @@
           <a:p>
             <a:fld id="{F138CC8D-C819-4717-8FDA-DAFA9F87967E}" type="datetimeFigureOut">
               <a:rPr lang="en-US" smtClean="0"/>
-              <a:t>3/9/2019</a:t>
+              <a:t>3/10/2019</a:t>
             </a:fld>
             <a:endParaRPr lang="en-US"/>
           </a:p>
@@ -6625,74 +6629,101 @@
           </a:prstGeom>
         </p:spPr>
       </p:pic>
+      <p:sp>
+        <p:nvSpPr>
+          <p:cNvPr id="3" name="Flowchart: Sequential Access Storage 2">
+            <a:extLst>
+              <a:ext uri="{FF2B5EF4-FFF2-40B4-BE49-F238E27FC236}">
+                <a16:creationId xmlns:a16="http://schemas.microsoft.com/office/drawing/2014/main" id="{DB5B82E0-50B0-41C5-9894-25169BF0E4B0}"/>
+              </a:ext>
+            </a:extLst>
+          </p:cNvPr>
+          <p:cNvSpPr/>
+          <p:nvPr/>
+        </p:nvSpPr>
+        <p:spPr>
+          <a:xfrm>
+            <a:off x="476250" y="5095875"/>
+            <a:ext cx="2733675" cy="1276350"/>
+          </a:xfrm>
+          <a:prstGeom prst="flowChartMagneticTape">
+            <a:avLst/>
+          </a:prstGeom>
+        </p:spPr>
+        <p:style>
+          <a:lnRef idx="2">
+            <a:schemeClr val="accent1">
+              <a:shade val="50000"/>
+            </a:schemeClr>
+          </a:lnRef>
+          <a:fillRef idx="1">
+            <a:schemeClr val="accent1"/>
+          </a:fillRef>
+          <a:effectRef idx="0">
+            <a:schemeClr val="accent1"/>
+          </a:effectRef>
+          <a:fontRef idx="minor">
+            <a:schemeClr val="lt1"/>
+          </a:fontRef>
+        </p:style>
+        <p:txBody>
+          <a:bodyPr rtlCol="0" anchor="ctr"/>
+          <a:lstStyle/>
+          <a:p>
+            <a:pPr algn="ctr"/>
+            <a:endParaRPr lang="en-US"/>
+          </a:p>
+        </p:txBody>
+      </p:sp>
+      <p:sp>
+        <p:nvSpPr>
+          <p:cNvPr id="4" name="TextBox 3">
+            <a:extLst>
+              <a:ext uri="{FF2B5EF4-FFF2-40B4-BE49-F238E27FC236}">
+                <a16:creationId xmlns:a16="http://schemas.microsoft.com/office/drawing/2014/main" id="{E43BD257-504B-4AF0-9127-B37380421C05}"/>
+              </a:ext>
+            </a:extLst>
+          </p:cNvPr>
+          <p:cNvSpPr txBox="1"/>
+          <p:nvPr/>
+        </p:nvSpPr>
+        <p:spPr>
+          <a:xfrm>
+            <a:off x="914400" y="5400675"/>
+            <a:ext cx="1876425" cy="646331"/>
+          </a:xfrm>
+          <a:prstGeom prst="rect">
+            <a:avLst/>
+          </a:prstGeom>
+          <a:noFill/>
+        </p:spPr>
+        <p:txBody>
+          <a:bodyPr wrap="square" rtlCol="0">
+            <a:spAutoFit/>
+          </a:bodyPr>
+          <a:lstStyle/>
+          <a:p>
+            <a:pPr algn="r" rtl="1"/>
+            <a:r>
+              <a:rPr lang="he-IL" sz="1200" b="1" dirty="0"/>
+              <a:t>בהינתן קוד נוסיף עמודה רלוונטית המתייחסת ל </a:t>
+            </a:r>
+            <a:r>
+              <a:rPr lang="en-US" sz="1200" b="1" dirty="0"/>
+              <a:t>path</a:t>
+            </a:r>
+            <a:r>
+              <a:rPr lang="he-IL" sz="1200" b="1" dirty="0"/>
+              <a:t> המתאים בקוד</a:t>
+            </a:r>
+            <a:endParaRPr lang="en-US" sz="1200" b="1" dirty="0"/>
+          </a:p>
+        </p:txBody>
+      </p:sp>
     </p:spTree>
     <p:extLst>
       <p:ext uri="{BB962C8B-B14F-4D97-AF65-F5344CB8AC3E}">
         <p14:creationId xmlns:p14="http://schemas.microsoft.com/office/powerpoint/2010/main" val="3712150288"/>
-      </p:ext>
-    </p:extLst>
-  </p:cSld>
-  <p:clrMapOvr>
-    <a:masterClrMapping/>
-  </p:clrMapOvr>
-</p:sld>
-</file>
-
-<file path=ppt/slides/slide12.xml><?xml version="1.0" encoding="utf-8"?>
-<p:sld xmlns:a="http://schemas.openxmlformats.org/drawingml/2006/main" xmlns:r="http://schemas.openxmlformats.org/officeDocument/2006/relationships" xmlns:p="http://schemas.openxmlformats.org/presentationml/2006/main">
-  <p:cSld>
-    <p:spTree>
-      <p:nvGrpSpPr>
-        <p:cNvPr id="1" name=""/>
-        <p:cNvGrpSpPr/>
-        <p:nvPr/>
-      </p:nvGrpSpPr>
-      <p:grpSpPr>
-        <a:xfrm>
-          <a:off x="0" y="0"/>
-          <a:ext cx="0" cy="0"/>
-          <a:chOff x="0" y="0"/>
-          <a:chExt cx="0" cy="0"/>
-        </a:xfrm>
-      </p:grpSpPr>
-      <p:sp>
-        <p:nvSpPr>
-          <p:cNvPr id="2" name="Title 1">
-            <a:extLst>
-              <a:ext uri="{FF2B5EF4-FFF2-40B4-BE49-F238E27FC236}">
-                <a16:creationId xmlns:a16="http://schemas.microsoft.com/office/drawing/2014/main" id="{3FBA9780-880C-4D40-AB4F-6746FB7FE877}"/>
-              </a:ext>
-            </a:extLst>
-          </p:cNvPr>
-          <p:cNvSpPr>
-            <a:spLocks noGrp="1"/>
-          </p:cNvSpPr>
-          <p:nvPr>
-            <p:ph type="ctrTitle"/>
-          </p:nvPr>
-        </p:nvSpPr>
-        <p:spPr>
-          <a:xfrm>
-            <a:off x="1507067" y="242359"/>
-            <a:ext cx="7766936" cy="1646302"/>
-          </a:xfrm>
-        </p:spPr>
-        <p:txBody>
-          <a:bodyPr/>
-          <a:lstStyle/>
-          <a:p>
-            <a:r>
-              <a:rPr lang="he-IL" dirty="0"/>
-              <a:t>מיפוי בין דרישות, קוד ובדיקות</a:t>
-            </a:r>
-            <a:endParaRPr lang="en-US" dirty="0"/>
-          </a:p>
-        </p:txBody>
-      </p:sp>
-    </p:spTree>
-    <p:extLst>
-      <p:ext uri="{BB962C8B-B14F-4D97-AF65-F5344CB8AC3E}">
-        <p14:creationId xmlns:p14="http://schemas.microsoft.com/office/powerpoint/2010/main" val="3647105202"/>
       </p:ext>
     </p:extLst>
   </p:cSld>

</xml_diff>